<commit_message>
Ran analysis for all truncated blocks
</commit_message>
<xml_diff>
--- a/tb_results/figs.pptx
+++ b/tb_results/figs.pptx
@@ -3672,10 +3672,10 @@
       </p:grpSpPr>
       <p:pic>
         <p:nvPicPr>
-          <p:cNvPr id="2" name="Picture 1">
+          <p:cNvPr id="3" name="Picture 2">
             <a:extLst>
               <a:ext uri="{FF2B5EF4-FFF2-40B4-BE49-F238E27FC236}">
-                <a16:creationId xmlns:a16="http://schemas.microsoft.com/office/drawing/2014/main" id="{382DAE05-0F8D-2266-87F1-875B51188292}"/>
+                <a16:creationId xmlns:a16="http://schemas.microsoft.com/office/drawing/2014/main" id="{652D5D70-F840-05A5-47DE-DEBAC41B7A5A}"/>
               </a:ext>
             </a:extLst>
           </p:cNvPr>
@@ -3692,8 +3692,8 @@
         </p:blipFill>
         <p:spPr>
           <a:xfrm>
-            <a:off x="685800" y="2440305"/>
-            <a:ext cx="7772400" cy="1977390"/>
+            <a:off x="685800" y="2427224"/>
+            <a:ext cx="7772400" cy="2003552"/>
           </a:xfrm>
           <a:prstGeom prst="rect">
             <a:avLst/>

</xml_diff>